<commit_message>
Tweaks to the powerpoint, modified Base64Wrapper to output as hex
</commit_message>
<xml_diff>
--- a/maven-v-gradle/maven-vs-gradle.pptx
+++ b/maven-v-gradle/maven-vs-gradle.pptx
@@ -976,7 +976,7 @@
             <a:fld id="{DAD260E4-C4B9-4F3B-A12E-FC255DA44A3E}" type="datetimeFigureOut">
               <a:rPr lang="en-US" smtClean="0"/>
               <a:pPr/>
-              <a:t>6/29/2013</a:t>
+              <a:t>7/5/2013</a:t>
             </a:fld>
             <a:endParaRPr lang="en-US"/>
           </a:p>
@@ -1163,7 +1163,7 @@
             <a:fld id="{DAD260E4-C4B9-4F3B-A12E-FC255DA44A3E}" type="datetimeFigureOut">
               <a:rPr lang="en-US" smtClean="0"/>
               <a:pPr/>
-              <a:t>6/29/2013</a:t>
+              <a:t>7/5/2013</a:t>
             </a:fld>
             <a:endParaRPr lang="en-US"/>
           </a:p>
@@ -1558,7 +1558,7 @@
             <a:fld id="{DAD260E4-C4B9-4F3B-A12E-FC255DA44A3E}" type="datetimeFigureOut">
               <a:rPr lang="en-US" smtClean="0"/>
               <a:pPr/>
-              <a:t>6/29/2013</a:t>
+              <a:t>7/5/2013</a:t>
             </a:fld>
             <a:endParaRPr lang="en-US"/>
           </a:p>
@@ -1969,7 +1969,7 @@
             <a:fld id="{DAD260E4-C4B9-4F3B-A12E-FC255DA44A3E}" type="datetimeFigureOut">
               <a:rPr lang="en-US" smtClean="0"/>
               <a:pPr/>
-              <a:t>6/29/2013</a:t>
+              <a:t>7/5/2013</a:t>
             </a:fld>
             <a:endParaRPr lang="en-US"/>
           </a:p>
@@ -2417,7 +2417,7 @@
             <a:fld id="{DAD260E4-C4B9-4F3B-A12E-FC255DA44A3E}" type="datetimeFigureOut">
               <a:rPr lang="en-US" smtClean="0"/>
               <a:pPr/>
-              <a:t>6/29/2013</a:t>
+              <a:t>7/5/2013</a:t>
             </a:fld>
             <a:endParaRPr lang="en-US"/>
           </a:p>
@@ -2520,7 +2520,7 @@
             <a:fld id="{DAD260E4-C4B9-4F3B-A12E-FC255DA44A3E}" type="datetimeFigureOut">
               <a:rPr lang="en-US" smtClean="0"/>
               <a:pPr/>
-              <a:t>6/29/2013</a:t>
+              <a:t>7/5/2013</a:t>
             </a:fld>
             <a:endParaRPr lang="en-US"/>
           </a:p>
@@ -2643,7 +2643,7 @@
             <a:fld id="{DAD260E4-C4B9-4F3B-A12E-FC255DA44A3E}" type="datetimeFigureOut">
               <a:rPr lang="en-US" smtClean="0"/>
               <a:pPr/>
-              <a:t>6/29/2013</a:t>
+              <a:t>7/5/2013</a:t>
             </a:fld>
             <a:endParaRPr lang="en-US"/>
           </a:p>
@@ -2919,7 +2919,7 @@
             <a:fld id="{DAD260E4-C4B9-4F3B-A12E-FC255DA44A3E}" type="datetimeFigureOut">
               <a:rPr lang="en-US" smtClean="0"/>
               <a:pPr/>
-              <a:t>6/29/2013</a:t>
+              <a:t>7/5/2013</a:t>
             </a:fld>
             <a:endParaRPr lang="en-US"/>
           </a:p>
@@ -3126,7 +3126,7 @@
             <a:fld id="{DAD260E4-C4B9-4F3B-A12E-FC255DA44A3E}" type="datetimeFigureOut">
               <a:rPr lang="en-US" smtClean="0"/>
               <a:pPr/>
-              <a:t>6/29/2013</a:t>
+              <a:t>7/5/2013</a:t>
             </a:fld>
             <a:endParaRPr lang="en-US"/>
           </a:p>
@@ -4237,7 +4237,7 @@
             <a:fld id="{DAD260E4-C4B9-4F3B-A12E-FC255DA44A3E}" type="datetimeFigureOut">
               <a:rPr lang="en-US" smtClean="0"/>
               <a:pPr/>
-              <a:t>6/29/2013</a:t>
+              <a:t>7/5/2013</a:t>
             </a:fld>
             <a:endParaRPr lang="en-US"/>
           </a:p>
@@ -4923,26 +4923,292 @@
               <a:rPr lang="en-US" dirty="0" smtClean="0">
                 <a:latin typeface="Book Antiqua" pitchFamily="18" charset="0"/>
               </a:rPr>
-              <a:t>Available </a:t>
-            </a:r>
-            <a:r>
-              <a:rPr lang="en-US" dirty="0" err="1" smtClean="0">
-                <a:latin typeface="Book Antiqua" pitchFamily="18" charset="0"/>
-              </a:rPr>
-              <a:t>plugins</a:t>
-            </a:r>
-            <a:r>
-              <a:rPr lang="en-US" dirty="0" smtClean="0">
-                <a:latin typeface="Book Antiqua" pitchFamily="18" charset="0"/>
-              </a:rPr>
-              <a:t>…</a:t>
-            </a:r>
-            <a:endParaRPr lang="en-US" dirty="0">
-              <a:latin typeface="Book Antiqua" pitchFamily="18" charset="0"/>
-            </a:endParaRPr>
-          </a:p>
-        </p:txBody>
-      </p:sp>
+              <a:t>Features….</a:t>
+            </a:r>
+          </a:p>
+        </p:txBody>
+      </p:sp>
+      <p:graphicFrame>
+        <p:nvGraphicFramePr>
+          <p:cNvPr id="3" name="Table 2"/>
+          <p:cNvGraphicFramePr>
+            <a:graphicFrameLocks noGrp="1"/>
+          </p:cNvGraphicFramePr>
+          <p:nvPr/>
+        </p:nvGraphicFramePr>
+        <p:xfrm>
+          <a:off x="457200" y="1397000"/>
+          <a:ext cx="8001000" cy="3632200"/>
+        </p:xfrm>
+        <a:graphic>
+          <a:graphicData uri="http://schemas.openxmlformats.org/drawingml/2006/table">
+            <a:tbl>
+              <a:tblPr firstRow="1" bandRow="1">
+                <a:tableStyleId>{5C22544A-7EE6-4342-B048-85BDC9FD1C3A}</a:tableStyleId>
+              </a:tblPr>
+              <a:tblGrid>
+                <a:gridCol w="1143000"/>
+                <a:gridCol w="3505200"/>
+                <a:gridCol w="3352800"/>
+              </a:tblGrid>
+              <a:tr h="432546">
+                <a:tc>
+                  <a:txBody>
+                    <a:bodyPr/>
+                    <a:lstStyle/>
+                    <a:p>
+                      <a:endParaRPr lang="en-US" dirty="0"/>
+                    </a:p>
+                  </a:txBody>
+                  <a:tcPr/>
+                </a:tc>
+                <a:tc>
+                  <a:txBody>
+                    <a:bodyPr/>
+                    <a:lstStyle/>
+                    <a:p>
+                      <a:r>
+                        <a:rPr lang="en-US" dirty="0" smtClean="0"/>
+                        <a:t>Advantages</a:t>
+                      </a:r>
+                      <a:endParaRPr lang="en-US" dirty="0"/>
+                    </a:p>
+                  </a:txBody>
+                  <a:tcPr/>
+                </a:tc>
+                <a:tc>
+                  <a:txBody>
+                    <a:bodyPr/>
+                    <a:lstStyle/>
+                    <a:p>
+                      <a:r>
+                        <a:rPr lang="en-US" dirty="0" smtClean="0"/>
+                        <a:t>Disadvantages</a:t>
+                      </a:r>
+                      <a:endParaRPr lang="en-US" dirty="0"/>
+                    </a:p>
+                  </a:txBody>
+                  <a:tcPr/>
+                </a:tc>
+              </a:tr>
+              <a:tr h="1848689">
+                <a:tc>
+                  <a:txBody>
+                    <a:bodyPr/>
+                    <a:lstStyle/>
+                    <a:p>
+                      <a:r>
+                        <a:rPr lang="en-US" dirty="0" smtClean="0"/>
+                        <a:t>Maven</a:t>
+                      </a:r>
+                      <a:endParaRPr lang="en-US" dirty="0"/>
+                    </a:p>
+                  </a:txBody>
+                  <a:tcPr/>
+                </a:tc>
+                <a:tc>
+                  <a:txBody>
+                    <a:bodyPr/>
+                    <a:lstStyle/>
+                    <a:p>
+                      <a:pPr>
+                        <a:buFont typeface="Arial" pitchFamily="34" charset="0"/>
+                        <a:buChar char="•"/>
+                      </a:pPr>
+                      <a:r>
+                        <a:rPr lang="en-US" sz="1400" dirty="0" smtClean="0"/>
+                        <a:t> Dependency management </a:t>
+                      </a:r>
+                    </a:p>
+                    <a:p>
+                      <a:pPr>
+                        <a:buFont typeface="Arial" pitchFamily="34" charset="0"/>
+                        <a:buChar char="•"/>
+                      </a:pPr>
+                      <a:r>
+                        <a:rPr lang="en-US" sz="1400" dirty="0" smtClean="0"/>
+                        <a:t> Standar</a:t>
+                      </a:r>
+                      <a:r>
+                        <a:rPr lang="en-US" sz="1400" baseline="0" dirty="0" smtClean="0"/>
+                        <a:t>dized project structure </a:t>
+                      </a:r>
+                    </a:p>
+                    <a:p>
+                      <a:pPr>
+                        <a:buFont typeface="Arial" pitchFamily="34" charset="0"/>
+                        <a:buChar char="•"/>
+                      </a:pPr>
+                      <a:r>
+                        <a:rPr lang="en-US" sz="1400" baseline="0" dirty="0" smtClean="0"/>
+                        <a:t> IDE integration support</a:t>
+                      </a:r>
+                    </a:p>
+                    <a:p>
+                      <a:pPr>
+                        <a:buFont typeface="Arial" pitchFamily="34" charset="0"/>
+                        <a:buChar char="•"/>
+                      </a:pPr>
+                      <a:r>
+                        <a:rPr lang="en-US" sz="1400" baseline="0" dirty="0" smtClean="0"/>
+                        <a:t> Good at what it does, difficult when things need to go ‘off script’ </a:t>
+                      </a:r>
+                    </a:p>
+                    <a:p>
+                      <a:pPr>
+                        <a:buFont typeface="Arial" pitchFamily="34" charset="0"/>
+                        <a:buChar char="•"/>
+                      </a:pPr>
+                      <a:r>
+                        <a:rPr lang="en-US" sz="1400" baseline="0" dirty="0" smtClean="0"/>
+                        <a:t> Major industry and commercial support</a:t>
+                      </a:r>
+                    </a:p>
+                    <a:p>
+                      <a:pPr>
+                        <a:buFont typeface="Arial" pitchFamily="34" charset="0"/>
+                        <a:buChar char="•"/>
+                      </a:pPr>
+                      <a:endParaRPr lang="en-US" sz="1400" dirty="0"/>
+                    </a:p>
+                  </a:txBody>
+                  <a:tcPr/>
+                </a:tc>
+                <a:tc>
+                  <a:txBody>
+                    <a:bodyPr/>
+                    <a:lstStyle/>
+                    <a:p>
+                      <a:pPr>
+                        <a:buFont typeface="Arial" pitchFamily="34" charset="0"/>
+                        <a:buChar char="•"/>
+                      </a:pPr>
+                      <a:r>
+                        <a:rPr lang="en-US" sz="1400" dirty="0" smtClean="0"/>
+                        <a:t> XML gets verbose</a:t>
+                      </a:r>
+                    </a:p>
+                    <a:p>
+                      <a:pPr>
+                        <a:buFont typeface="Arial" pitchFamily="34" charset="0"/>
+                        <a:buChar char="•"/>
+                      </a:pPr>
+                      <a:r>
+                        <a:rPr lang="en-US" sz="1400" dirty="0" smtClean="0"/>
+                        <a:t> Historical baggage</a:t>
+                      </a:r>
+                      <a:r>
+                        <a:rPr lang="en-US" sz="1400" baseline="0" dirty="0" smtClean="0"/>
+                        <a:t> for backwards compatibility</a:t>
+                      </a:r>
+                    </a:p>
+                    <a:p>
+                      <a:pPr>
+                        <a:buFont typeface="Arial" pitchFamily="34" charset="0"/>
+                        <a:buChar char="•"/>
+                      </a:pPr>
+                      <a:r>
+                        <a:rPr lang="en-US" sz="1400" baseline="0" dirty="0" smtClean="0"/>
+                        <a:t> Difficult to make it do custom tasks</a:t>
+                      </a:r>
+                      <a:endParaRPr lang="en-US" sz="1400" dirty="0"/>
+                    </a:p>
+                  </a:txBody>
+                  <a:tcPr/>
+                </a:tc>
+              </a:tr>
+              <a:tr h="1350965">
+                <a:tc>
+                  <a:txBody>
+                    <a:bodyPr/>
+                    <a:lstStyle/>
+                    <a:p>
+                      <a:r>
+                        <a:rPr lang="en-US" dirty="0" smtClean="0"/>
+                        <a:t>Gradle</a:t>
+                      </a:r>
+                      <a:endParaRPr lang="en-US" dirty="0"/>
+                    </a:p>
+                  </a:txBody>
+                  <a:tcPr/>
+                </a:tc>
+                <a:tc>
+                  <a:txBody>
+                    <a:bodyPr/>
+                    <a:lstStyle/>
+                    <a:p>
+                      <a:pPr>
+                        <a:buFont typeface="Arial" pitchFamily="34" charset="0"/>
+                        <a:buChar char="•"/>
+                      </a:pPr>
+                      <a:r>
+                        <a:rPr lang="en-US" sz="1400" dirty="0" smtClean="0"/>
+                        <a:t> Dependency management</a:t>
+                      </a:r>
+                    </a:p>
+                    <a:p>
+                      <a:pPr>
+                        <a:buFont typeface="Arial" pitchFamily="34" charset="0"/>
+                        <a:buChar char="•"/>
+                      </a:pPr>
+                      <a:r>
+                        <a:rPr lang="en-US" sz="1400" baseline="0" dirty="0" smtClean="0"/>
+                        <a:t> Smaller build files (DSL vs. XML)</a:t>
+                      </a:r>
+                    </a:p>
+                    <a:p>
+                      <a:pPr>
+                        <a:buFont typeface="Arial" pitchFamily="34" charset="0"/>
+                        <a:buChar char="•"/>
+                      </a:pPr>
+                      <a:r>
+                        <a:rPr lang="en-US" sz="1400" baseline="0" dirty="0" smtClean="0"/>
+                        <a:t> Harnesses groovy to build custom tasks</a:t>
+                      </a:r>
+                    </a:p>
+                    <a:p>
+                      <a:pPr>
+                        <a:buFont typeface="Arial" pitchFamily="34" charset="0"/>
+                        <a:buNone/>
+                      </a:pPr>
+                      <a:endParaRPr lang="en-US" sz="1400" dirty="0"/>
+                    </a:p>
+                  </a:txBody>
+                  <a:tcPr/>
+                </a:tc>
+                <a:tc>
+                  <a:txBody>
+                    <a:bodyPr/>
+                    <a:lstStyle/>
+                    <a:p>
+                      <a:pPr>
+                        <a:buFont typeface="Arial" pitchFamily="34" charset="0"/>
+                        <a:buChar char="•"/>
+                      </a:pPr>
+                      <a:r>
+                        <a:rPr lang="en-US" sz="1400" baseline="0" dirty="0" smtClean="0"/>
+                        <a:t> DSL to learn</a:t>
+                      </a:r>
+                    </a:p>
+                    <a:p>
+                      <a:pPr>
+                        <a:buFont typeface="Arial" pitchFamily="34" charset="0"/>
+                        <a:buChar char="•"/>
+                      </a:pPr>
+                      <a:r>
+                        <a:rPr lang="en-US" sz="1400" baseline="0" dirty="0" smtClean="0"/>
+                        <a:t> Poorly-structured builds can become difficult to follow and/or maintain (like Ant)</a:t>
+                      </a:r>
+                      <a:endParaRPr lang="en-US" sz="1400" dirty="0"/>
+                    </a:p>
+                  </a:txBody>
+                  <a:tcPr/>
+                </a:tc>
+              </a:tr>
+            </a:tbl>
+          </a:graphicData>
+        </a:graphic>
+      </p:graphicFrame>
     </p:spTree>
   </p:cSld>
   <p:clrMapOvr>
@@ -4983,7 +5249,7 @@
         </p:nvSpPr>
         <p:spPr>
           <a:xfrm>
-            <a:off x="2286000" y="1828800"/>
+            <a:off x="1905000" y="1828800"/>
             <a:ext cx="5105400" cy="584775"/>
           </a:xfrm>
           <a:prstGeom prst="rect">
@@ -5020,7 +5286,7 @@
         <p:spPr>
           <a:xfrm>
             <a:off x="2590800" y="2483584"/>
-            <a:ext cx="4724400" cy="1631216"/>
+            <a:ext cx="4724400" cy="1323439"/>
           </a:xfrm>
           <a:prstGeom prst="rect">
             <a:avLst/>
@@ -5045,11 +5311,7 @@
             </a:pPr>
             <a:r>
               <a:rPr lang="en-US" sz="2000" dirty="0" smtClean="0"/>
-              <a:t> </a:t>
-            </a:r>
-            <a:r>
-              <a:rPr lang="en-US" sz="2000" dirty="0" smtClean="0"/>
-              <a:t> </a:t>
+              <a:t>  </a:t>
             </a:r>
             <a:r>
               <a:rPr lang="en-US" sz="2000" dirty="0" err="1" smtClean="0"/>
@@ -5067,11 +5329,7 @@
             </a:pPr>
             <a:r>
               <a:rPr lang="en-US" sz="2000" dirty="0" smtClean="0"/>
-              <a:t> </a:t>
-            </a:r>
-            <a:r>
-              <a:rPr lang="en-US" sz="2000" dirty="0" smtClean="0"/>
-              <a:t> Groovy/Grails Tool Suite 3.2</a:t>
+              <a:t>  Groovy/Grails Tool Suite 3.2</a:t>
             </a:r>
           </a:p>
           <a:p>
@@ -5081,26 +5339,90 @@
             </a:pPr>
             <a:r>
               <a:rPr lang="en-US" sz="2000" dirty="0" smtClean="0"/>
-              <a:t> </a:t>
+              <a:t>  Gradle </a:t>
             </a:r>
             <a:r>
               <a:rPr lang="en-US" sz="2000" dirty="0" smtClean="0"/>
-              <a:t> Gradle extension</a:t>
-            </a:r>
-          </a:p>
-          <a:p>
-            <a:pPr>
-              <a:buFont typeface="Arial" pitchFamily="34" charset="0"/>
-              <a:buChar char="•"/>
-            </a:pPr>
-            <a:r>
-              <a:rPr lang="en-US" sz="2000" dirty="0" smtClean="0"/>
-              <a:t> </a:t>
-            </a:r>
-            <a:r>
-              <a:rPr lang="en-US" sz="2000" dirty="0" smtClean="0"/>
-              <a:t> Tomcat 7</a:t>
-            </a:r>
+              <a:t>extension</a:t>
+            </a:r>
+            <a:endParaRPr lang="en-US" sz="2000" dirty="0" smtClean="0"/>
+          </a:p>
+        </p:txBody>
+      </p:sp>
+      <p:sp>
+        <p:nvSpPr>
+          <p:cNvPr id="4" name="TextBox 3"/>
+          <p:cNvSpPr txBox="1"/>
+          <p:nvPr/>
+        </p:nvSpPr>
+        <p:spPr>
+          <a:xfrm>
+            <a:off x="1905000" y="4343400"/>
+            <a:ext cx="5715000" cy="400110"/>
+          </a:xfrm>
+          <a:prstGeom prst="rect">
+            <a:avLst/>
+          </a:prstGeom>
+          <a:noFill/>
+        </p:spPr>
+        <p:txBody>
+          <a:bodyPr wrap="square" rtlCol="0">
+            <a:spAutoFit/>
+          </a:bodyPr>
+          <a:lstStyle/>
+          <a:p>
+            <a:r>
+              <a:rPr lang="en-US" sz="2000" dirty="0" smtClean="0">
+                <a:latin typeface="Book Antiqua" pitchFamily="18" charset="0"/>
+                <a:ea typeface="Batang" pitchFamily="18" charset="-127"/>
+              </a:rPr>
+              <a:t>All demo code found at:</a:t>
+            </a:r>
+            <a:endParaRPr lang="en-US" sz="2000" dirty="0">
+              <a:latin typeface="Book Antiqua" pitchFamily="18" charset="0"/>
+              <a:ea typeface="Batang" pitchFamily="18" charset="-127"/>
+            </a:endParaRPr>
+          </a:p>
+        </p:txBody>
+      </p:sp>
+      <p:sp>
+        <p:nvSpPr>
+          <p:cNvPr id="5" name="TextBox 4"/>
+          <p:cNvSpPr txBox="1"/>
+          <p:nvPr/>
+        </p:nvSpPr>
+        <p:spPr>
+          <a:xfrm>
+            <a:off x="2209800" y="4724400"/>
+            <a:ext cx="4495800" cy="400110"/>
+          </a:xfrm>
+          <a:prstGeom prst="rect">
+            <a:avLst/>
+          </a:prstGeom>
+          <a:noFill/>
+        </p:spPr>
+        <p:txBody>
+          <a:bodyPr wrap="square" rtlCol="0">
+            <a:spAutoFit/>
+          </a:bodyPr>
+          <a:lstStyle/>
+          <a:p>
+            <a:r>
+              <a:rPr lang="en-US" sz="2000" dirty="0" smtClean="0">
+                <a:hlinkClick r:id="rId2"/>
+              </a:rPr>
+              <a:t>https</a:t>
+            </a:r>
+            <a:r>
+              <a:rPr lang="en-US" sz="2000" dirty="0" smtClean="0">
+                <a:hlinkClick r:id="rId2"/>
+              </a:rPr>
+              <a:t>://github.com/kcjava/public</a:t>
+            </a:r>
+            <a:endParaRPr lang="en-US" sz="2000" dirty="0">
+              <a:latin typeface="Book Antiqua" pitchFamily="18" charset="0"/>
+              <a:ea typeface="Batang" pitchFamily="18" charset="-127"/>
+            </a:endParaRPr>
           </a:p>
         </p:txBody>
       </p:sp>

</xml_diff>

<commit_message>
Adding Gradle 1.6 reference to the installed software page
</commit_message>
<xml_diff>
--- a/maven-v-gradle/maven-vs-gradle.pptx
+++ b/maven-v-gradle/maven-vs-gradle.pptx
@@ -976,7 +976,7 @@
             <a:fld id="{DAD260E4-C4B9-4F3B-A12E-FC255DA44A3E}" type="datetimeFigureOut">
               <a:rPr lang="en-US" smtClean="0"/>
               <a:pPr/>
-              <a:t>7/5/2013</a:t>
+              <a:t>7/10/2013</a:t>
             </a:fld>
             <a:endParaRPr lang="en-US"/>
           </a:p>
@@ -1163,7 +1163,7 @@
             <a:fld id="{DAD260E4-C4B9-4F3B-A12E-FC255DA44A3E}" type="datetimeFigureOut">
               <a:rPr lang="en-US" smtClean="0"/>
               <a:pPr/>
-              <a:t>7/5/2013</a:t>
+              <a:t>7/10/2013</a:t>
             </a:fld>
             <a:endParaRPr lang="en-US"/>
           </a:p>
@@ -1558,7 +1558,7 @@
             <a:fld id="{DAD260E4-C4B9-4F3B-A12E-FC255DA44A3E}" type="datetimeFigureOut">
               <a:rPr lang="en-US" smtClean="0"/>
               <a:pPr/>
-              <a:t>7/5/2013</a:t>
+              <a:t>7/10/2013</a:t>
             </a:fld>
             <a:endParaRPr lang="en-US"/>
           </a:p>
@@ -1969,7 +1969,7 @@
             <a:fld id="{DAD260E4-C4B9-4F3B-A12E-FC255DA44A3E}" type="datetimeFigureOut">
               <a:rPr lang="en-US" smtClean="0"/>
               <a:pPr/>
-              <a:t>7/5/2013</a:t>
+              <a:t>7/10/2013</a:t>
             </a:fld>
             <a:endParaRPr lang="en-US"/>
           </a:p>
@@ -2417,7 +2417,7 @@
             <a:fld id="{DAD260E4-C4B9-4F3B-A12E-FC255DA44A3E}" type="datetimeFigureOut">
               <a:rPr lang="en-US" smtClean="0"/>
               <a:pPr/>
-              <a:t>7/5/2013</a:t>
+              <a:t>7/10/2013</a:t>
             </a:fld>
             <a:endParaRPr lang="en-US"/>
           </a:p>
@@ -2520,7 +2520,7 @@
             <a:fld id="{DAD260E4-C4B9-4F3B-A12E-FC255DA44A3E}" type="datetimeFigureOut">
               <a:rPr lang="en-US" smtClean="0"/>
               <a:pPr/>
-              <a:t>7/5/2013</a:t>
+              <a:t>7/10/2013</a:t>
             </a:fld>
             <a:endParaRPr lang="en-US"/>
           </a:p>
@@ -2643,7 +2643,7 @@
             <a:fld id="{DAD260E4-C4B9-4F3B-A12E-FC255DA44A3E}" type="datetimeFigureOut">
               <a:rPr lang="en-US" smtClean="0"/>
               <a:pPr/>
-              <a:t>7/5/2013</a:t>
+              <a:t>7/10/2013</a:t>
             </a:fld>
             <a:endParaRPr lang="en-US"/>
           </a:p>
@@ -2919,7 +2919,7 @@
             <a:fld id="{DAD260E4-C4B9-4F3B-A12E-FC255DA44A3E}" type="datetimeFigureOut">
               <a:rPr lang="en-US" smtClean="0"/>
               <a:pPr/>
-              <a:t>7/5/2013</a:t>
+              <a:t>7/10/2013</a:t>
             </a:fld>
             <a:endParaRPr lang="en-US"/>
           </a:p>
@@ -3126,7 +3126,7 @@
             <a:fld id="{DAD260E4-C4B9-4F3B-A12E-FC255DA44A3E}" type="datetimeFigureOut">
               <a:rPr lang="en-US" smtClean="0"/>
               <a:pPr/>
-              <a:t>7/5/2013</a:t>
+              <a:t>7/10/2013</a:t>
             </a:fld>
             <a:endParaRPr lang="en-US"/>
           </a:p>
@@ -4237,7 +4237,7 @@
             <a:fld id="{DAD260E4-C4B9-4F3B-A12E-FC255DA44A3E}" type="datetimeFigureOut">
               <a:rPr lang="en-US" smtClean="0"/>
               <a:pPr/>
-              <a:t>7/5/2013</a:t>
+              <a:t>7/10/2013</a:t>
             </a:fld>
             <a:endParaRPr lang="en-US"/>
           </a:p>
@@ -5286,7 +5286,7 @@
         <p:spPr>
           <a:xfrm>
             <a:off x="2590800" y="2483584"/>
-            <a:ext cx="4724400" cy="1323439"/>
+            <a:ext cx="4724400" cy="1631216"/>
           </a:xfrm>
           <a:prstGeom prst="rect">
             <a:avLst/>
@@ -5344,6 +5344,20 @@
             <a:r>
               <a:rPr lang="en-US" sz="2000" dirty="0" smtClean="0"/>
               <a:t>extension</a:t>
+            </a:r>
+          </a:p>
+          <a:p>
+            <a:pPr>
+              <a:buFont typeface="Arial" pitchFamily="34" charset="0"/>
+              <a:buChar char="•"/>
+            </a:pPr>
+            <a:r>
+              <a:rPr lang="en-US" sz="2000" smtClean="0"/>
+              <a:t> </a:t>
+            </a:r>
+            <a:r>
+              <a:rPr lang="en-US" sz="2000" smtClean="0"/>
+              <a:t> Gradle 1.6</a:t>
             </a:r>
             <a:endParaRPr lang="en-US" sz="2000" dirty="0" smtClean="0"/>
           </a:p>
@@ -5411,13 +5425,7 @@
               <a:rPr lang="en-US" sz="2000" dirty="0" smtClean="0">
                 <a:hlinkClick r:id="rId2"/>
               </a:rPr>
-              <a:t>https</a:t>
-            </a:r>
-            <a:r>
-              <a:rPr lang="en-US" sz="2000" dirty="0" smtClean="0">
-                <a:hlinkClick r:id="rId2"/>
-              </a:rPr>
-              <a:t>://github.com/kcjava/public</a:t>
+              <a:t>https://github.com/kcjava/public</a:t>
             </a:r>
             <a:endParaRPr lang="en-US" sz="2000" dirty="0">
               <a:latin typeface="Book Antiqua" pitchFamily="18" charset="0"/>

</xml_diff>